<commit_message>
Add some more explanation
</commit_message>
<xml_diff>
--- a/Documentation/IntellifireEvents.pptx
+++ b/Documentation/IntellifireEvents.pptx
@@ -106,442 +106,20 @@
       </a:defRPr>
     </a:lvl9pPr>
   </p:defaultTextStyle>
+  <p:extLst>
+    <p:ext uri="{EFAFB233-063F-42B5-8137-9DF3F51BA10A}">
+      <p15:sldGuideLst xmlns:p15="http://schemas.microsoft.com/office/powerpoint/2012/main"/>
+    </p:ext>
+  </p:extLst>
 </p:presentation>
 </file>
 
 <file path=ppt/revisionInfo.xml><?xml version="1.0" encoding="utf-8"?>
 <p1510:revInfo xmlns:a="http://schemas.openxmlformats.org/drawingml/2006/main" xmlns:r="http://schemas.openxmlformats.org/officeDocument/2006/relationships" xmlns:p1510="http://schemas.microsoft.com/office/powerpoint/2015/10/main">
   <p1510:revLst>
-    <p1510:client id="{36519944-3293-422B-9A2A-3579D642F727}" v="14" dt="2025-02-03T12:59:14.481"/>
+    <p1510:client id="{36519944-3293-422B-9A2A-3579D642F727}" v="15" dt="2025-02-03T19:16:24.800"/>
   </p1510:revLst>
 </p1510:revInfo>
-</file>
-
-<file path=ppt/changesInfos/changesInfo1.xml><?xml version="1.0" encoding="utf-8"?>
-<pc:chgInfo xmlns:a="http://schemas.openxmlformats.org/drawingml/2006/main" xmlns:r="http://schemas.openxmlformats.org/officeDocument/2006/relationships" xmlns:ac="http://schemas.microsoft.com/office/drawing/2013/main/command" xmlns:pc="http://schemas.microsoft.com/office/powerpoint/2013/main/command">
-  <pc:docChgLst>
-    <pc:chgData name="Brenda Camacho Garcia (student)" userId="c901e4ae-eabc-4c8e-91f4-b6bfa679ef6e" providerId="ADAL" clId="{36519944-3293-422B-9A2A-3579D642F727}"/>
-    <pc:docChg chg="undo custSel addSld modSld">
-      <pc:chgData name="Brenda Camacho Garcia (student)" userId="c901e4ae-eabc-4c8e-91f4-b6bfa679ef6e" providerId="ADAL" clId="{36519944-3293-422B-9A2A-3579D642F727}" dt="2025-02-03T13:36:56.618" v="1599" actId="20577"/>
-      <pc:docMkLst>
-        <pc:docMk/>
-      </pc:docMkLst>
-      <pc:sldChg chg="modSp mod">
-        <pc:chgData name="Brenda Camacho Garcia (student)" userId="c901e4ae-eabc-4c8e-91f4-b6bfa679ef6e" providerId="ADAL" clId="{36519944-3293-422B-9A2A-3579D642F727}" dt="2025-02-03T12:39:30.952" v="0" actId="313"/>
-        <pc:sldMkLst>
-          <pc:docMk/>
-          <pc:sldMk cId="1976575075" sldId="256"/>
-        </pc:sldMkLst>
-        <pc:spChg chg="mod">
-          <ac:chgData name="Brenda Camacho Garcia (student)" userId="c901e4ae-eabc-4c8e-91f4-b6bfa679ef6e" providerId="ADAL" clId="{36519944-3293-422B-9A2A-3579D642F727}" dt="2025-02-03T12:39:30.952" v="0" actId="313"/>
-          <ac:spMkLst>
-            <pc:docMk/>
-            <pc:sldMk cId="1976575075" sldId="256"/>
-            <ac:spMk id="7" creationId="{374B23D2-28B3-A176-4F55-6642188BBE56}"/>
-          </ac:spMkLst>
-        </pc:spChg>
-      </pc:sldChg>
-      <pc:sldChg chg="addSp delSp modSp new mod">
-        <pc:chgData name="Brenda Camacho Garcia (student)" userId="c901e4ae-eabc-4c8e-91f4-b6bfa679ef6e" providerId="ADAL" clId="{36519944-3293-422B-9A2A-3579D642F727}" dt="2025-02-03T13:07:01.553" v="1305" actId="20577"/>
-        <pc:sldMkLst>
-          <pc:docMk/>
-          <pc:sldMk cId="289723714" sldId="257"/>
-        </pc:sldMkLst>
-        <pc:spChg chg="mod">
-          <ac:chgData name="Brenda Camacho Garcia (student)" userId="c901e4ae-eabc-4c8e-91f4-b6bfa679ef6e" providerId="ADAL" clId="{36519944-3293-422B-9A2A-3579D642F727}" dt="2025-02-03T12:49:24.126" v="321" actId="1076"/>
-          <ac:spMkLst>
-            <pc:docMk/>
-            <pc:sldMk cId="289723714" sldId="257"/>
-            <ac:spMk id="2" creationId="{5E0136BF-62DB-108D-F43D-E4082B4D378D}"/>
-          </ac:spMkLst>
-        </pc:spChg>
-        <pc:spChg chg="add del mod">
-          <ac:chgData name="Brenda Camacho Garcia (student)" userId="c901e4ae-eabc-4c8e-91f4-b6bfa679ef6e" providerId="ADAL" clId="{36519944-3293-422B-9A2A-3579D642F727}" dt="2025-02-03T12:40:10.972" v="30" actId="478"/>
-          <ac:spMkLst>
-            <pc:docMk/>
-            <pc:sldMk cId="289723714" sldId="257"/>
-            <ac:spMk id="3" creationId="{51BC46DE-601D-478F-0B90-D2AFB8D4634D}"/>
-          </ac:spMkLst>
-        </pc:spChg>
-        <pc:spChg chg="add del mod">
-          <ac:chgData name="Brenda Camacho Garcia (student)" userId="c901e4ae-eabc-4c8e-91f4-b6bfa679ef6e" providerId="ADAL" clId="{36519944-3293-422B-9A2A-3579D642F727}" dt="2025-02-03T12:46:54.394" v="102" actId="1076"/>
-          <ac:spMkLst>
-            <pc:docMk/>
-            <pc:sldMk cId="289723714" sldId="257"/>
-            <ac:spMk id="4" creationId="{4677F5E7-08EE-CF50-211A-3F06761A3FAE}"/>
-          </ac:spMkLst>
-        </pc:spChg>
-        <pc:spChg chg="add mod">
-          <ac:chgData name="Brenda Camacho Garcia (student)" userId="c901e4ae-eabc-4c8e-91f4-b6bfa679ef6e" providerId="ADAL" clId="{36519944-3293-422B-9A2A-3579D642F727}" dt="2025-02-03T12:46:54.394" v="102" actId="1076"/>
-          <ac:spMkLst>
-            <pc:docMk/>
-            <pc:sldMk cId="289723714" sldId="257"/>
-            <ac:spMk id="5" creationId="{D218DF31-72A6-BA5A-C93F-7407E507CB34}"/>
-          </ac:spMkLst>
-        </pc:spChg>
-        <pc:spChg chg="add mod">
-          <ac:chgData name="Brenda Camacho Garcia (student)" userId="c901e4ae-eabc-4c8e-91f4-b6bfa679ef6e" providerId="ADAL" clId="{36519944-3293-422B-9A2A-3579D642F727}" dt="2025-02-03T12:46:54.394" v="102" actId="1076"/>
-          <ac:spMkLst>
-            <pc:docMk/>
-            <pc:sldMk cId="289723714" sldId="257"/>
-            <ac:spMk id="16" creationId="{5A690E25-0A80-7040-AC1A-1E84F285B4D4}"/>
-          </ac:spMkLst>
-        </pc:spChg>
-        <pc:spChg chg="add mod">
-          <ac:chgData name="Brenda Camacho Garcia (student)" userId="c901e4ae-eabc-4c8e-91f4-b6bfa679ef6e" providerId="ADAL" clId="{36519944-3293-422B-9A2A-3579D642F727}" dt="2025-02-03T12:46:54.394" v="102" actId="1076"/>
-          <ac:spMkLst>
-            <pc:docMk/>
-            <pc:sldMk cId="289723714" sldId="257"/>
-            <ac:spMk id="17" creationId="{421A30CC-3771-4F85-76D2-7F66C66EF0A3}"/>
-          </ac:spMkLst>
-        </pc:spChg>
-        <pc:spChg chg="add mod">
-          <ac:chgData name="Brenda Camacho Garcia (student)" userId="c901e4ae-eabc-4c8e-91f4-b6bfa679ef6e" providerId="ADAL" clId="{36519944-3293-422B-9A2A-3579D642F727}" dt="2025-02-03T12:46:54.394" v="102" actId="1076"/>
-          <ac:spMkLst>
-            <pc:docMk/>
-            <pc:sldMk cId="289723714" sldId="257"/>
-            <ac:spMk id="18" creationId="{2025F8CA-FE84-FF0A-AD24-BB348DE8BF71}"/>
-          </ac:spMkLst>
-        </pc:spChg>
-        <pc:spChg chg="add mod">
-          <ac:chgData name="Brenda Camacho Garcia (student)" userId="c901e4ae-eabc-4c8e-91f4-b6bfa679ef6e" providerId="ADAL" clId="{36519944-3293-422B-9A2A-3579D642F727}" dt="2025-02-03T12:46:54.394" v="102" actId="1076"/>
-          <ac:spMkLst>
-            <pc:docMk/>
-            <pc:sldMk cId="289723714" sldId="257"/>
-            <ac:spMk id="19" creationId="{E727700B-15B4-7E0A-21C9-A69D1558E5A4}"/>
-          </ac:spMkLst>
-        </pc:spChg>
-        <pc:spChg chg="add mod">
-          <ac:chgData name="Brenda Camacho Garcia (student)" userId="c901e4ae-eabc-4c8e-91f4-b6bfa679ef6e" providerId="ADAL" clId="{36519944-3293-422B-9A2A-3579D642F727}" dt="2025-02-03T13:07:01.553" v="1305" actId="20577"/>
-          <ac:spMkLst>
-            <pc:docMk/>
-            <pc:sldMk cId="289723714" sldId="257"/>
-            <ac:spMk id="30" creationId="{514F279A-9824-3B10-60F3-7EE887BC5153}"/>
-          </ac:spMkLst>
-        </pc:spChg>
-        <pc:cxnChg chg="add mod">
-          <ac:chgData name="Brenda Camacho Garcia (student)" userId="c901e4ae-eabc-4c8e-91f4-b6bfa679ef6e" providerId="ADAL" clId="{36519944-3293-422B-9A2A-3579D642F727}" dt="2025-02-03T12:41:18.006" v="39" actId="17032"/>
-          <ac:cxnSpMkLst>
-            <pc:docMk/>
-            <pc:sldMk cId="289723714" sldId="257"/>
-            <ac:cxnSpMk id="7" creationId="{4F47B63F-9B78-F18B-1A13-779D387182A4}"/>
-          </ac:cxnSpMkLst>
-        </pc:cxnChg>
-        <pc:cxnChg chg="add mod">
-          <ac:chgData name="Brenda Camacho Garcia (student)" userId="c901e4ae-eabc-4c8e-91f4-b6bfa679ef6e" providerId="ADAL" clId="{36519944-3293-422B-9A2A-3579D642F727}" dt="2025-02-03T12:46:54.394" v="102" actId="1076"/>
-          <ac:cxnSpMkLst>
-            <pc:docMk/>
-            <pc:sldMk cId="289723714" sldId="257"/>
-            <ac:cxnSpMk id="9" creationId="{3981409D-1977-580F-A895-0FED01A01AE5}"/>
-          </ac:cxnSpMkLst>
-        </pc:cxnChg>
-        <pc:cxnChg chg="add mod">
-          <ac:chgData name="Brenda Camacho Garcia (student)" userId="c901e4ae-eabc-4c8e-91f4-b6bfa679ef6e" providerId="ADAL" clId="{36519944-3293-422B-9A2A-3579D642F727}" dt="2025-02-03T12:46:54.394" v="102" actId="1076"/>
-          <ac:cxnSpMkLst>
-            <pc:docMk/>
-            <pc:sldMk cId="289723714" sldId="257"/>
-            <ac:cxnSpMk id="10" creationId="{F65259DB-34C4-1D28-4B9C-3F2A1B51D645}"/>
-          </ac:cxnSpMkLst>
-        </pc:cxnChg>
-        <pc:cxnChg chg="add mod">
-          <ac:chgData name="Brenda Camacho Garcia (student)" userId="c901e4ae-eabc-4c8e-91f4-b6bfa679ef6e" providerId="ADAL" clId="{36519944-3293-422B-9A2A-3579D642F727}" dt="2025-02-03T12:46:54.394" v="102" actId="1076"/>
-          <ac:cxnSpMkLst>
-            <pc:docMk/>
-            <pc:sldMk cId="289723714" sldId="257"/>
-            <ac:cxnSpMk id="15" creationId="{BA3095F9-A7C3-E245-94F1-328565945147}"/>
-          </ac:cxnSpMkLst>
-        </pc:cxnChg>
-        <pc:cxnChg chg="add del mod">
-          <ac:chgData name="Brenda Camacho Garcia (student)" userId="c901e4ae-eabc-4c8e-91f4-b6bfa679ef6e" providerId="ADAL" clId="{36519944-3293-422B-9A2A-3579D642F727}" dt="2025-02-03T12:46:32.074" v="97" actId="478"/>
-          <ac:cxnSpMkLst>
-            <pc:docMk/>
-            <pc:sldMk cId="289723714" sldId="257"/>
-            <ac:cxnSpMk id="21" creationId="{58E19C73-D089-4304-968A-9CA139785E13}"/>
-          </ac:cxnSpMkLst>
-        </pc:cxnChg>
-        <pc:cxnChg chg="add del">
-          <ac:chgData name="Brenda Camacho Garcia (student)" userId="c901e4ae-eabc-4c8e-91f4-b6bfa679ef6e" providerId="ADAL" clId="{36519944-3293-422B-9A2A-3579D642F727}" dt="2025-02-03T12:46:40.074" v="99" actId="478"/>
-          <ac:cxnSpMkLst>
-            <pc:docMk/>
-            <pc:sldMk cId="289723714" sldId="257"/>
-            <ac:cxnSpMk id="24" creationId="{DA5B06B9-CE0D-3591-5B8A-1907F2E3875A}"/>
-          </ac:cxnSpMkLst>
-        </pc:cxnChg>
-        <pc:cxnChg chg="add mod">
-          <ac:chgData name="Brenda Camacho Garcia (student)" userId="c901e4ae-eabc-4c8e-91f4-b6bfa679ef6e" providerId="ADAL" clId="{36519944-3293-422B-9A2A-3579D642F727}" dt="2025-02-03T12:46:54.394" v="102" actId="1076"/>
-          <ac:cxnSpMkLst>
-            <pc:docMk/>
-            <pc:sldMk cId="289723714" sldId="257"/>
-            <ac:cxnSpMk id="26" creationId="{402772D2-FC44-9D8B-0734-5851AAD2ABB0}"/>
-          </ac:cxnSpMkLst>
-        </pc:cxnChg>
-      </pc:sldChg>
-      <pc:sldChg chg="addSp delSp modSp new mod">
-        <pc:chgData name="Brenda Camacho Garcia (student)" userId="c901e4ae-eabc-4c8e-91f4-b6bfa679ef6e" providerId="ADAL" clId="{36519944-3293-422B-9A2A-3579D642F727}" dt="2025-02-03T13:36:56.618" v="1599" actId="20577"/>
-        <pc:sldMkLst>
-          <pc:docMk/>
-          <pc:sldMk cId="4231637878" sldId="258"/>
-        </pc:sldMkLst>
-        <pc:spChg chg="del">
-          <ac:chgData name="Brenda Camacho Garcia (student)" userId="c901e4ae-eabc-4c8e-91f4-b6bfa679ef6e" providerId="ADAL" clId="{36519944-3293-422B-9A2A-3579D642F727}" dt="2025-02-03T12:51:47.359" v="508" actId="478"/>
-          <ac:spMkLst>
-            <pc:docMk/>
-            <pc:sldMk cId="4231637878" sldId="258"/>
-            <ac:spMk id="2" creationId="{B3DF28D1-EBE1-B5FD-A189-FDB7E5ACB17C}"/>
-          </ac:spMkLst>
-        </pc:spChg>
-        <pc:spChg chg="add del mod">
-          <ac:chgData name="Brenda Camacho Garcia (student)" userId="c901e4ae-eabc-4c8e-91f4-b6bfa679ef6e" providerId="ADAL" clId="{36519944-3293-422B-9A2A-3579D642F727}" dt="2025-02-03T12:56:36.256" v="616" actId="478"/>
-          <ac:spMkLst>
-            <pc:docMk/>
-            <pc:sldMk cId="4231637878" sldId="258"/>
-            <ac:spMk id="3" creationId="{B16CEDFD-A63A-D11D-6538-D7E6580F6D9B}"/>
-          </ac:spMkLst>
-        </pc:spChg>
-        <pc:spChg chg="add del mod">
-          <ac:chgData name="Brenda Camacho Garcia (student)" userId="c901e4ae-eabc-4c8e-91f4-b6bfa679ef6e" providerId="ADAL" clId="{36519944-3293-422B-9A2A-3579D642F727}" dt="2025-02-03T12:56:36.256" v="616" actId="478"/>
-          <ac:spMkLst>
-            <pc:docMk/>
-            <pc:sldMk cId="4231637878" sldId="258"/>
-            <ac:spMk id="4" creationId="{9360B111-2E3C-1D60-3357-8DA73FD11D88}"/>
-          </ac:spMkLst>
-        </pc:spChg>
-        <pc:spChg chg="add del mod">
-          <ac:chgData name="Brenda Camacho Garcia (student)" userId="c901e4ae-eabc-4c8e-91f4-b6bfa679ef6e" providerId="ADAL" clId="{36519944-3293-422B-9A2A-3579D642F727}" dt="2025-02-03T12:51:53.753" v="510" actId="478"/>
-          <ac:spMkLst>
-            <pc:docMk/>
-            <pc:sldMk cId="4231637878" sldId="258"/>
-            <ac:spMk id="9" creationId="{CA9CB44B-5D14-3680-EF37-E77E15E116BA}"/>
-          </ac:spMkLst>
-        </pc:spChg>
-        <pc:spChg chg="add del mod">
-          <ac:chgData name="Brenda Camacho Garcia (student)" userId="c901e4ae-eabc-4c8e-91f4-b6bfa679ef6e" providerId="ADAL" clId="{36519944-3293-422B-9A2A-3579D642F727}" dt="2025-02-03T12:51:52.116" v="509" actId="478"/>
-          <ac:spMkLst>
-            <pc:docMk/>
-            <pc:sldMk cId="4231637878" sldId="258"/>
-            <ac:spMk id="10" creationId="{A8D51B30-DA08-69ED-83CE-0E46CF05A695}"/>
-          </ac:spMkLst>
-        </pc:spChg>
-        <pc:spChg chg="add del mod">
-          <ac:chgData name="Brenda Camacho Garcia (student)" userId="c901e4ae-eabc-4c8e-91f4-b6bfa679ef6e" providerId="ADAL" clId="{36519944-3293-422B-9A2A-3579D642F727}" dt="2025-02-03T12:52:01.534" v="512" actId="478"/>
-          <ac:spMkLst>
-            <pc:docMk/>
-            <pc:sldMk cId="4231637878" sldId="258"/>
-            <ac:spMk id="11" creationId="{D86B1452-A13D-127C-84EC-D251C736691E}"/>
-          </ac:spMkLst>
-        </pc:spChg>
-        <pc:spChg chg="add del mod">
-          <ac:chgData name="Brenda Camacho Garcia (student)" userId="c901e4ae-eabc-4c8e-91f4-b6bfa679ef6e" providerId="ADAL" clId="{36519944-3293-422B-9A2A-3579D642F727}" dt="2025-02-03T12:51:56.706" v="511" actId="478"/>
-          <ac:spMkLst>
-            <pc:docMk/>
-            <pc:sldMk cId="4231637878" sldId="258"/>
-            <ac:spMk id="12" creationId="{788DF4B0-51D2-1859-3563-67A73791CB72}"/>
-          </ac:spMkLst>
-        </pc:spChg>
-        <pc:spChg chg="add del mod">
-          <ac:chgData name="Brenda Camacho Garcia (student)" userId="c901e4ae-eabc-4c8e-91f4-b6bfa679ef6e" providerId="ADAL" clId="{36519944-3293-422B-9A2A-3579D642F727}" dt="2025-02-03T12:55:01.352" v="604" actId="478"/>
-          <ac:spMkLst>
-            <pc:docMk/>
-            <pc:sldMk cId="4231637878" sldId="258"/>
-            <ac:spMk id="21" creationId="{FB85DE68-6B76-1AEC-C3A2-59E458FD83DE}"/>
-          </ac:spMkLst>
-        </pc:spChg>
-        <pc:spChg chg="add mod">
-          <ac:chgData name="Brenda Camacho Garcia (student)" userId="c901e4ae-eabc-4c8e-91f4-b6bfa679ef6e" providerId="ADAL" clId="{36519944-3293-422B-9A2A-3579D642F727}" dt="2025-02-03T12:56:42.115" v="617" actId="1076"/>
-          <ac:spMkLst>
-            <pc:docMk/>
-            <pc:sldMk cId="4231637878" sldId="258"/>
-            <ac:spMk id="22" creationId="{3C72C07F-6EE9-321F-1C91-325530D7BD2A}"/>
-          </ac:spMkLst>
-        </pc:spChg>
-        <pc:spChg chg="add mod">
-          <ac:chgData name="Brenda Camacho Garcia (student)" userId="c901e4ae-eabc-4c8e-91f4-b6bfa679ef6e" providerId="ADAL" clId="{36519944-3293-422B-9A2A-3579D642F727}" dt="2025-02-03T12:56:42.115" v="617" actId="1076"/>
-          <ac:spMkLst>
-            <pc:docMk/>
-            <pc:sldMk cId="4231637878" sldId="258"/>
-            <ac:spMk id="23" creationId="{9E5EAA9C-977E-52B7-DF12-74C4361D8C0D}"/>
-          </ac:spMkLst>
-        </pc:spChg>
-        <pc:spChg chg="add del mod">
-          <ac:chgData name="Brenda Camacho Garcia (student)" userId="c901e4ae-eabc-4c8e-91f4-b6bfa679ef6e" providerId="ADAL" clId="{36519944-3293-422B-9A2A-3579D642F727}" dt="2025-02-03T12:55:38.216" v="609" actId="478"/>
-          <ac:spMkLst>
-            <pc:docMk/>
-            <pc:sldMk cId="4231637878" sldId="258"/>
-            <ac:spMk id="32" creationId="{CA4FDFEE-8492-EF9A-9B5C-8BECF21F6C8E}"/>
-          </ac:spMkLst>
-        </pc:spChg>
-        <pc:spChg chg="add mod">
-          <ac:chgData name="Brenda Camacho Garcia (student)" userId="c901e4ae-eabc-4c8e-91f4-b6bfa679ef6e" providerId="ADAL" clId="{36519944-3293-422B-9A2A-3579D642F727}" dt="2025-02-03T13:36:56.618" v="1599" actId="20577"/>
-          <ac:spMkLst>
-            <pc:docMk/>
-            <pc:sldMk cId="4231637878" sldId="258"/>
-            <ac:spMk id="39" creationId="{F1B17D54-A437-B3C7-3CAD-FBBA63AEE25D}"/>
-          </ac:spMkLst>
-        </pc:spChg>
-        <pc:spChg chg="add mod">
-          <ac:chgData name="Brenda Camacho Garcia (student)" userId="c901e4ae-eabc-4c8e-91f4-b6bfa679ef6e" providerId="ADAL" clId="{36519944-3293-422B-9A2A-3579D642F727}" dt="2025-02-03T13:36:31.843" v="1590" actId="1076"/>
-          <ac:spMkLst>
-            <pc:docMk/>
-            <pc:sldMk cId="4231637878" sldId="258"/>
-            <ac:spMk id="40" creationId="{7B2B3BF9-535C-5324-3FA7-1F9FF62B63D8}"/>
-          </ac:spMkLst>
-        </pc:spChg>
-        <pc:cxnChg chg="add del mod">
-          <ac:chgData name="Brenda Camacho Garcia (student)" userId="c901e4ae-eabc-4c8e-91f4-b6bfa679ef6e" providerId="ADAL" clId="{36519944-3293-422B-9A2A-3579D642F727}" dt="2025-02-03T12:56:36.256" v="616" actId="478"/>
-          <ac:cxnSpMkLst>
-            <pc:docMk/>
-            <pc:sldMk cId="4231637878" sldId="258"/>
-            <ac:cxnSpMk id="5" creationId="{E3AE9A9D-93E1-60BA-EF90-03F684CECE8A}"/>
-          </ac:cxnSpMkLst>
-        </pc:cxnChg>
-        <pc:cxnChg chg="add del mod">
-          <ac:chgData name="Brenda Camacho Garcia (student)" userId="c901e4ae-eabc-4c8e-91f4-b6bfa679ef6e" providerId="ADAL" clId="{36519944-3293-422B-9A2A-3579D642F727}" dt="2025-02-03T12:56:36.256" v="616" actId="478"/>
-          <ac:cxnSpMkLst>
-            <pc:docMk/>
-            <pc:sldMk cId="4231637878" sldId="258"/>
-            <ac:cxnSpMk id="6" creationId="{27387972-E677-853D-BCF0-DB3F99456A2F}"/>
-          </ac:cxnSpMkLst>
-        </pc:cxnChg>
-        <pc:cxnChg chg="del">
-          <ac:chgData name="Brenda Camacho Garcia (student)" userId="c901e4ae-eabc-4c8e-91f4-b6bfa679ef6e" providerId="ADAL" clId="{36519944-3293-422B-9A2A-3579D642F727}" dt="2025-02-03T12:56:36.256" v="616" actId="478"/>
-          <ac:cxnSpMkLst>
-            <pc:docMk/>
-            <pc:sldMk cId="4231637878" sldId="258"/>
-            <ac:cxnSpMk id="7" creationId="{048B0B07-0A03-1254-8D61-B19A30337EC4}"/>
-          </ac:cxnSpMkLst>
-        </pc:cxnChg>
-        <pc:cxnChg chg="add del mod">
-          <ac:chgData name="Brenda Camacho Garcia (student)" userId="c901e4ae-eabc-4c8e-91f4-b6bfa679ef6e" providerId="ADAL" clId="{36519944-3293-422B-9A2A-3579D642F727}" dt="2025-02-03T12:56:36.256" v="616" actId="478"/>
-          <ac:cxnSpMkLst>
-            <pc:docMk/>
-            <pc:sldMk cId="4231637878" sldId="258"/>
-            <ac:cxnSpMk id="8" creationId="{149345D9-96E3-7774-5155-52CCE2E41AB6}"/>
-          </ac:cxnSpMkLst>
-        </pc:cxnChg>
-        <pc:cxnChg chg="add del mod">
-          <ac:chgData name="Brenda Camacho Garcia (student)" userId="c901e4ae-eabc-4c8e-91f4-b6bfa679ef6e" providerId="ADAL" clId="{36519944-3293-422B-9A2A-3579D642F727}" dt="2025-02-03T12:52:02.396" v="513" actId="478"/>
-          <ac:cxnSpMkLst>
-            <pc:docMk/>
-            <pc:sldMk cId="4231637878" sldId="258"/>
-            <ac:cxnSpMk id="13" creationId="{944A28E8-499A-FCE6-0391-9731CFB9B923}"/>
-          </ac:cxnSpMkLst>
-        </pc:cxnChg>
-        <pc:cxnChg chg="add del mod">
-          <ac:chgData name="Brenda Camacho Garcia (student)" userId="c901e4ae-eabc-4c8e-91f4-b6bfa679ef6e" providerId="ADAL" clId="{36519944-3293-422B-9A2A-3579D642F727}" dt="2025-02-03T12:56:36.256" v="616" actId="478"/>
-          <ac:cxnSpMkLst>
-            <pc:docMk/>
-            <pc:sldMk cId="4231637878" sldId="258"/>
-            <ac:cxnSpMk id="15" creationId="{9C2ECE5A-7AC6-FDCB-44EA-D6B123984188}"/>
-          </ac:cxnSpMkLst>
-        </pc:cxnChg>
-        <pc:cxnChg chg="add del mod">
-          <ac:chgData name="Brenda Camacho Garcia (student)" userId="c901e4ae-eabc-4c8e-91f4-b6bfa679ef6e" providerId="ADAL" clId="{36519944-3293-422B-9A2A-3579D642F727}" dt="2025-02-03T12:56:36.256" v="616" actId="478"/>
-          <ac:cxnSpMkLst>
-            <pc:docMk/>
-            <pc:sldMk cId="4231637878" sldId="258"/>
-            <ac:cxnSpMk id="17" creationId="{55D644C7-58B1-6217-DC27-623723691D67}"/>
-          </ac:cxnSpMkLst>
-        </pc:cxnChg>
-        <pc:cxnChg chg="add del mod">
-          <ac:chgData name="Brenda Camacho Garcia (student)" userId="c901e4ae-eabc-4c8e-91f4-b6bfa679ef6e" providerId="ADAL" clId="{36519944-3293-422B-9A2A-3579D642F727}" dt="2025-02-03T12:56:36.256" v="616" actId="478"/>
-          <ac:cxnSpMkLst>
-            <pc:docMk/>
-            <pc:sldMk cId="4231637878" sldId="258"/>
-            <ac:cxnSpMk id="18" creationId="{1E9B5749-50EB-63ED-0192-068563D479BA}"/>
-          </ac:cxnSpMkLst>
-        </pc:cxnChg>
-        <pc:cxnChg chg="add del mod">
-          <ac:chgData name="Brenda Camacho Garcia (student)" userId="c901e4ae-eabc-4c8e-91f4-b6bfa679ef6e" providerId="ADAL" clId="{36519944-3293-422B-9A2A-3579D642F727}" dt="2025-02-03T12:56:36.256" v="616" actId="478"/>
-          <ac:cxnSpMkLst>
-            <pc:docMk/>
-            <pc:sldMk cId="4231637878" sldId="258"/>
-            <ac:cxnSpMk id="19" creationId="{FCA402DA-11FE-CE1E-6774-33FB9C34FCB9}"/>
-          </ac:cxnSpMkLst>
-        </pc:cxnChg>
-        <pc:cxnChg chg="add mod">
-          <ac:chgData name="Brenda Camacho Garcia (student)" userId="c901e4ae-eabc-4c8e-91f4-b6bfa679ef6e" providerId="ADAL" clId="{36519944-3293-422B-9A2A-3579D642F727}" dt="2025-02-03T12:56:42.115" v="617" actId="1076"/>
-          <ac:cxnSpMkLst>
-            <pc:docMk/>
-            <pc:sldMk cId="4231637878" sldId="258"/>
-            <ac:cxnSpMk id="24" creationId="{1C3896F7-95DB-855C-C502-67555DFE8C7A}"/>
-          </ac:cxnSpMkLst>
-        </pc:cxnChg>
-        <pc:cxnChg chg="add mod">
-          <ac:chgData name="Brenda Camacho Garcia (student)" userId="c901e4ae-eabc-4c8e-91f4-b6bfa679ef6e" providerId="ADAL" clId="{36519944-3293-422B-9A2A-3579D642F727}" dt="2025-02-03T12:56:42.115" v="617" actId="1076"/>
-          <ac:cxnSpMkLst>
-            <pc:docMk/>
-            <pc:sldMk cId="4231637878" sldId="258"/>
-            <ac:cxnSpMk id="25" creationId="{81F6B80A-536A-09C2-AF07-8C3D5B635884}"/>
-          </ac:cxnSpMkLst>
-        </pc:cxnChg>
-        <pc:cxnChg chg="add mod">
-          <ac:chgData name="Brenda Camacho Garcia (student)" userId="c901e4ae-eabc-4c8e-91f4-b6bfa679ef6e" providerId="ADAL" clId="{36519944-3293-422B-9A2A-3579D642F727}" dt="2025-02-03T12:56:42.115" v="617" actId="1076"/>
-          <ac:cxnSpMkLst>
-            <pc:docMk/>
-            <pc:sldMk cId="4231637878" sldId="258"/>
-            <ac:cxnSpMk id="26" creationId="{3BD802F1-32EB-FC0C-7780-419F6BAF0EB7}"/>
-          </ac:cxnSpMkLst>
-        </pc:cxnChg>
-        <pc:cxnChg chg="add mod">
-          <ac:chgData name="Brenda Camacho Garcia (student)" userId="c901e4ae-eabc-4c8e-91f4-b6bfa679ef6e" providerId="ADAL" clId="{36519944-3293-422B-9A2A-3579D642F727}" dt="2025-02-03T12:55:16.084" v="606" actId="1076"/>
-          <ac:cxnSpMkLst>
-            <pc:docMk/>
-            <pc:sldMk cId="4231637878" sldId="258"/>
-            <ac:cxnSpMk id="27" creationId="{4437E39A-752D-0D1C-3AB8-80FEAD7D836A}"/>
-          </ac:cxnSpMkLst>
-        </pc:cxnChg>
-        <pc:cxnChg chg="add mod">
-          <ac:chgData name="Brenda Camacho Garcia (student)" userId="c901e4ae-eabc-4c8e-91f4-b6bfa679ef6e" providerId="ADAL" clId="{36519944-3293-422B-9A2A-3579D642F727}" dt="2025-02-03T12:56:42.115" v="617" actId="1076"/>
-          <ac:cxnSpMkLst>
-            <pc:docMk/>
-            <pc:sldMk cId="4231637878" sldId="258"/>
-            <ac:cxnSpMk id="28" creationId="{0EDDDABE-9743-D4CE-DFFE-029A69D36049}"/>
-          </ac:cxnSpMkLst>
-        </pc:cxnChg>
-        <pc:cxnChg chg="add mod">
-          <ac:chgData name="Brenda Camacho Garcia (student)" userId="c901e4ae-eabc-4c8e-91f4-b6bfa679ef6e" providerId="ADAL" clId="{36519944-3293-422B-9A2A-3579D642F727}" dt="2025-02-03T12:56:42.115" v="617" actId="1076"/>
-          <ac:cxnSpMkLst>
-            <pc:docMk/>
-            <pc:sldMk cId="4231637878" sldId="258"/>
-            <ac:cxnSpMk id="29" creationId="{6DA75349-C9A1-48D7-2E01-72716A246582}"/>
-          </ac:cxnSpMkLst>
-        </pc:cxnChg>
-        <pc:cxnChg chg="add mod">
-          <ac:chgData name="Brenda Camacho Garcia (student)" userId="c901e4ae-eabc-4c8e-91f4-b6bfa679ef6e" providerId="ADAL" clId="{36519944-3293-422B-9A2A-3579D642F727}" dt="2025-02-03T12:56:42.115" v="617" actId="1076"/>
-          <ac:cxnSpMkLst>
-            <pc:docMk/>
-            <pc:sldMk cId="4231637878" sldId="258"/>
-            <ac:cxnSpMk id="30" creationId="{D0EBCEE7-2521-3F33-D067-F85B691FD90D}"/>
-          </ac:cxnSpMkLst>
-        </pc:cxnChg>
-        <pc:cxnChg chg="add mod">
-          <ac:chgData name="Brenda Camacho Garcia (student)" userId="c901e4ae-eabc-4c8e-91f4-b6bfa679ef6e" providerId="ADAL" clId="{36519944-3293-422B-9A2A-3579D642F727}" dt="2025-02-03T12:56:42.115" v="617" actId="1076"/>
-          <ac:cxnSpMkLst>
-            <pc:docMk/>
-            <pc:sldMk cId="4231637878" sldId="258"/>
-            <ac:cxnSpMk id="31" creationId="{27E51268-4E20-D0BF-79A0-AEA371B35DCC}"/>
-          </ac:cxnSpMkLst>
-        </pc:cxnChg>
-        <pc:cxnChg chg="add del mod">
-          <ac:chgData name="Brenda Camacho Garcia (student)" userId="c901e4ae-eabc-4c8e-91f4-b6bfa679ef6e" providerId="ADAL" clId="{36519944-3293-422B-9A2A-3579D642F727}" dt="2025-02-03T12:56:03.038" v="613" actId="478"/>
-          <ac:cxnSpMkLst>
-            <pc:docMk/>
-            <pc:sldMk cId="4231637878" sldId="258"/>
-            <ac:cxnSpMk id="34" creationId="{24B6A1F7-D4BA-0D91-39F3-E2383FEDFBD5}"/>
-          </ac:cxnSpMkLst>
-        </pc:cxnChg>
-        <pc:cxnChg chg="add mod">
-          <ac:chgData name="Brenda Camacho Garcia (student)" userId="c901e4ae-eabc-4c8e-91f4-b6bfa679ef6e" providerId="ADAL" clId="{36519944-3293-422B-9A2A-3579D642F727}" dt="2025-02-03T12:56:42.115" v="617" actId="1076"/>
-          <ac:cxnSpMkLst>
-            <pc:docMk/>
-            <pc:sldMk cId="4231637878" sldId="258"/>
-            <ac:cxnSpMk id="38" creationId="{2597D1C2-7A6A-5571-C7CF-23E7C72C976D}"/>
-          </ac:cxnSpMkLst>
-        </pc:cxnChg>
-      </pc:sldChg>
-    </pc:docChg>
-  </pc:docChgLst>
-</pc:chgInfo>
 </file>
 
 <file path=ppt/slideLayouts/slideLayout1.xml><?xml version="1.0" encoding="utf-8"?>
@@ -693,7 +271,7 @@
           <a:p>
             <a:fld id="{4A23AE83-9234-4B33-8575-B78E26A3B7C6}" type="datetimeFigureOut">
               <a:rPr lang="en-GB" smtClean="0"/>
-              <a:t>02/02/2025</a:t>
+              <a:t>03/02/2025</a:t>
             </a:fld>
             <a:endParaRPr lang="en-GB"/>
           </a:p>
@@ -893,7 +471,7 @@
           <a:p>
             <a:fld id="{4A23AE83-9234-4B33-8575-B78E26A3B7C6}" type="datetimeFigureOut">
               <a:rPr lang="en-GB" smtClean="0"/>
-              <a:t>02/02/2025</a:t>
+              <a:t>03/02/2025</a:t>
             </a:fld>
             <a:endParaRPr lang="en-GB"/>
           </a:p>
@@ -1103,7 +681,7 @@
           <a:p>
             <a:fld id="{4A23AE83-9234-4B33-8575-B78E26A3B7C6}" type="datetimeFigureOut">
               <a:rPr lang="en-GB" smtClean="0"/>
-              <a:t>02/02/2025</a:t>
+              <a:t>03/02/2025</a:t>
             </a:fld>
             <a:endParaRPr lang="en-GB"/>
           </a:p>
@@ -1303,7 +881,7 @@
           <a:p>
             <a:fld id="{4A23AE83-9234-4B33-8575-B78E26A3B7C6}" type="datetimeFigureOut">
               <a:rPr lang="en-GB" smtClean="0"/>
-              <a:t>02/02/2025</a:t>
+              <a:t>03/02/2025</a:t>
             </a:fld>
             <a:endParaRPr lang="en-GB"/>
           </a:p>
@@ -1579,7 +1157,7 @@
           <a:p>
             <a:fld id="{4A23AE83-9234-4B33-8575-B78E26A3B7C6}" type="datetimeFigureOut">
               <a:rPr lang="en-GB" smtClean="0"/>
-              <a:t>02/02/2025</a:t>
+              <a:t>03/02/2025</a:t>
             </a:fld>
             <a:endParaRPr lang="en-GB"/>
           </a:p>
@@ -1847,7 +1425,7 @@
           <a:p>
             <a:fld id="{4A23AE83-9234-4B33-8575-B78E26A3B7C6}" type="datetimeFigureOut">
               <a:rPr lang="en-GB" smtClean="0"/>
-              <a:t>02/02/2025</a:t>
+              <a:t>03/02/2025</a:t>
             </a:fld>
             <a:endParaRPr lang="en-GB"/>
           </a:p>
@@ -2262,7 +1840,7 @@
           <a:p>
             <a:fld id="{4A23AE83-9234-4B33-8575-B78E26A3B7C6}" type="datetimeFigureOut">
               <a:rPr lang="en-GB" smtClean="0"/>
-              <a:t>02/02/2025</a:t>
+              <a:t>03/02/2025</a:t>
             </a:fld>
             <a:endParaRPr lang="en-GB"/>
           </a:p>
@@ -2404,7 +1982,7 @@
           <a:p>
             <a:fld id="{4A23AE83-9234-4B33-8575-B78E26A3B7C6}" type="datetimeFigureOut">
               <a:rPr lang="en-GB" smtClean="0"/>
-              <a:t>02/02/2025</a:t>
+              <a:t>03/02/2025</a:t>
             </a:fld>
             <a:endParaRPr lang="en-GB"/>
           </a:p>
@@ -2517,7 +2095,7 @@
           <a:p>
             <a:fld id="{4A23AE83-9234-4B33-8575-B78E26A3B7C6}" type="datetimeFigureOut">
               <a:rPr lang="en-GB" smtClean="0"/>
-              <a:t>02/02/2025</a:t>
+              <a:t>03/02/2025</a:t>
             </a:fld>
             <a:endParaRPr lang="en-GB"/>
           </a:p>
@@ -2830,7 +2408,7 @@
           <a:p>
             <a:fld id="{4A23AE83-9234-4B33-8575-B78E26A3B7C6}" type="datetimeFigureOut">
               <a:rPr lang="en-GB" smtClean="0"/>
-              <a:t>02/02/2025</a:t>
+              <a:t>03/02/2025</a:t>
             </a:fld>
             <a:endParaRPr lang="en-GB"/>
           </a:p>
@@ -3119,7 +2697,7 @@
           <a:p>
             <a:fld id="{4A23AE83-9234-4B33-8575-B78E26A3B7C6}" type="datetimeFigureOut">
               <a:rPr lang="en-GB" smtClean="0"/>
-              <a:t>02/02/2025</a:t>
+              <a:t>03/02/2025</a:t>
             </a:fld>
             <a:endParaRPr lang="en-GB"/>
           </a:p>
@@ -3362,7 +2940,7 @@
           <a:p>
             <a:fld id="{4A23AE83-9234-4B33-8575-B78E26A3B7C6}" type="datetimeFigureOut">
               <a:rPr lang="en-GB" smtClean="0"/>
-              <a:t>02/02/2025</a:t>
+              <a:t>03/02/2025</a:t>
             </a:fld>
             <a:endParaRPr lang="en-GB"/>
           </a:p>
@@ -5000,19 +4578,7 @@
           <a:p>
             <a:r>
               <a:rPr lang="en-US" dirty="0"/>
-              <a:t>Still, </a:t>
-            </a:r>
-            <a:r>
-              <a:rPr lang="en-US"/>
-              <a:t>we won’t be </a:t>
-            </a:r>
-            <a:r>
-              <a:rPr lang="en-US" dirty="0"/>
-              <a:t>able to know the exact distance, but at least that we are within </a:t>
-            </a:r>
-            <a:r>
-              <a:rPr lang="en-US"/>
-              <a:t>certain range.</a:t>
+              <a:t>We won’t be able to know the exact distance, but at least we will know that the flame is within certain range.</a:t>
             </a:r>
             <a:endParaRPr lang="en-GB" dirty="0"/>
           </a:p>
@@ -5032,8 +4598,8 @@
         </p:nvSpPr>
         <p:spPr>
           <a:xfrm>
-            <a:off x="2685492" y="2467335"/>
-            <a:ext cx="5971948" cy="3139321"/>
+            <a:off x="2685492" y="1953564"/>
+            <a:ext cx="8497620" cy="3139321"/>
           </a:xfrm>
           <a:prstGeom prst="rect">
             <a:avLst/>
@@ -5070,11 +4636,13 @@
             </a:r>
           </a:p>
           <a:p>
-            <a:pPr marL="285750" indent="-285750">
-              <a:buFont typeface="Arial" panose="020B0604020202020204" pitchFamily="34" charset="0"/>
-              <a:buChar char="•"/>
-            </a:pPr>
             <a:endParaRPr lang="en-GB" dirty="0"/>
+          </a:p>
+          <a:p>
+            <a:r>
+              <a:rPr lang="en-GB" dirty="0"/>
+              <a:t>We can place the sensors in a way in which the range of detection match the range of operation of the water pump. </a:t>
+            </a:r>
           </a:p>
         </p:txBody>
       </p:sp>

</xml_diff>